<commit_message>
added results from codingDojo
</commit_message>
<xml_diff>
--- a/ZertifikatFehlersuche/CodingDojo_Coding FehlersucheC_CS.pptx
+++ b/ZertifikatFehlersuche/CodingDojo_Coding FehlersucheC_CS.pptx
@@ -5,7 +5,7 @@
     <p:sldMasterId id="2147483667" r:id="rId1"/>
   </p:sldMasterIdLst>
   <p:notesMasterIdLst>
-    <p:notesMasterId r:id="rId11"/>
+    <p:notesMasterId r:id="rId13"/>
   </p:notesMasterIdLst>
   <p:sldIdLst>
     <p:sldId id="270" r:id="rId2"/>
@@ -13,10 +13,12 @@
     <p:sldId id="279" r:id="rId4"/>
     <p:sldId id="266" r:id="rId5"/>
     <p:sldId id="267" r:id="rId6"/>
-    <p:sldId id="280" r:id="rId7"/>
-    <p:sldId id="283" r:id="rId8"/>
-    <p:sldId id="282" r:id="rId9"/>
-    <p:sldId id="281" r:id="rId10"/>
+    <p:sldId id="284" r:id="rId7"/>
+    <p:sldId id="280" r:id="rId8"/>
+    <p:sldId id="283" r:id="rId9"/>
+    <p:sldId id="285" r:id="rId10"/>
+    <p:sldId id="282" r:id="rId11"/>
+    <p:sldId id="281" r:id="rId12"/>
   </p:sldIdLst>
   <p:sldSz cx="12192000" cy="6858000"/>
   <p:notesSz cx="6858000" cy="9144000"/>
@@ -216,7 +218,7 @@
           <a:p>
             <a:fld id="{550C01F7-036F-4DDB-91D3-72DE411FB950}" type="datetimeFigureOut">
               <a:rPr lang="de-AT" smtClean="0"/>
-              <a:t>07.01.2022</a:t>
+              <a:t>04.02.2022</a:t>
             </a:fld>
             <a:endParaRPr lang="de-AT"/>
           </a:p>
@@ -1540,7 +1542,7 @@
           <a:p>
             <a:r>
               <a:rPr lang="en-GB" dirty="0"/>
-              <a:t>20-30 min Code Analyse</a:t>
+              <a:t>30 min Code Analyse</a:t>
             </a:r>
           </a:p>
           <a:p>
@@ -1557,7 +1559,7 @@
           <a:p>
             <a:r>
               <a:rPr lang="en-GB" dirty="0"/>
-              <a:t>15 min </a:t>
+              <a:t>20 min </a:t>
             </a:r>
             <a:r>
               <a:rPr lang="en-GB" dirty="0" err="1"/>
@@ -1710,7 +1712,7 @@
           <a:p>
             <a:fld id="{222DE6FD-D7F2-49F0-A0DD-6365E6F7E0B0}" type="slidenum">
               <a:rPr lang="de-AT" smtClean="0"/>
-              <a:t>7</a:t>
+              <a:t>8</a:t>
             </a:fld>
             <a:endParaRPr lang="de-AT"/>
           </a:p>
@@ -3131,7 +3133,7 @@
           <a:p>
             <a:fld id="{4F9BBA49-313F-47D7-A954-C3F504465317}" type="datetimeFigureOut">
               <a:rPr lang="de-AT" smtClean="0"/>
-              <a:t>07.01.2022</a:t>
+              <a:t>04.02.2022</a:t>
             </a:fld>
             <a:endParaRPr lang="de-AT"/>
           </a:p>
@@ -3301,7 +3303,7 @@
           <a:p>
             <a:fld id="{4F9BBA49-313F-47D7-A954-C3F504465317}" type="datetimeFigureOut">
               <a:rPr lang="de-AT" smtClean="0"/>
-              <a:t>07.01.2022</a:t>
+              <a:t>04.02.2022</a:t>
             </a:fld>
             <a:endParaRPr lang="de-AT"/>
           </a:p>
@@ -6590,7 +6592,7 @@
             </a:br>
             <a:r>
               <a:rPr lang="de-AT" sz="2400" b="1" dirty="0"/>
-              <a:t>22.10.2021</a:t>
+              <a:t>04.02.2021</a:t>
             </a:r>
             <a:endParaRPr lang="de-AT" sz="1800" b="1" dirty="0"/>
           </a:p>
@@ -6672,6 +6674,222 @@
     <p:extLst>
       <p:ext uri="{BB962C8B-B14F-4D97-AF65-F5344CB8AC3E}">
         <p14:creationId xmlns:p14="http://schemas.microsoft.com/office/powerpoint/2010/main" val="1132118467"/>
+      </p:ext>
+    </p:extLst>
+  </p:cSld>
+  <p:clrMapOvr>
+    <a:masterClrMapping/>
+  </p:clrMapOvr>
+</p:sld>
+</file>
+
+<file path=ppt/slides/slide10.xml><?xml version="1.0" encoding="utf-8"?>
+<p:sld xmlns:a="http://schemas.openxmlformats.org/drawingml/2006/main" xmlns:r="http://schemas.openxmlformats.org/officeDocument/2006/relationships" xmlns:p="http://schemas.openxmlformats.org/presentationml/2006/main">
+  <p:cSld>
+    <p:spTree>
+      <p:nvGrpSpPr>
+        <p:cNvPr id="1" name=""/>
+        <p:cNvGrpSpPr/>
+        <p:nvPr/>
+      </p:nvGrpSpPr>
+      <p:grpSpPr>
+        <a:xfrm>
+          <a:off x="0" y="0"/>
+          <a:ext cx="0" cy="0"/>
+          <a:chOff x="0" y="0"/>
+          <a:chExt cx="0" cy="0"/>
+        </a:xfrm>
+      </p:grpSpPr>
+      <p:pic>
+        <p:nvPicPr>
+          <p:cNvPr id="5" name="Picture 4">
+            <a:extLst>
+              <a:ext uri="{FF2B5EF4-FFF2-40B4-BE49-F238E27FC236}">
+                <a16:creationId xmlns:a16="http://schemas.microsoft.com/office/drawing/2014/main" id="{DDE5771A-5809-48F4-B564-DB3921DC7456}"/>
+              </a:ext>
+            </a:extLst>
+          </p:cNvPr>
+          <p:cNvPicPr>
+            <a:picLocks noChangeAspect="1"/>
+          </p:cNvPicPr>
+          <p:nvPr/>
+        </p:nvPicPr>
+        <p:blipFill>
+          <a:blip r:embed="rId2"/>
+          <a:stretch>
+            <a:fillRect/>
+          </a:stretch>
+        </p:blipFill>
+        <p:spPr>
+          <a:xfrm>
+            <a:off x="6558589" y="0"/>
+            <a:ext cx="4529416" cy="6858000"/>
+          </a:xfrm>
+          <a:prstGeom prst="rect">
+            <a:avLst/>
+          </a:prstGeom>
+        </p:spPr>
+      </p:pic>
+      <p:pic>
+        <p:nvPicPr>
+          <p:cNvPr id="3" name="Picture 2">
+            <a:extLst>
+              <a:ext uri="{FF2B5EF4-FFF2-40B4-BE49-F238E27FC236}">
+                <a16:creationId xmlns:a16="http://schemas.microsoft.com/office/drawing/2014/main" id="{7D1DFDAC-891A-4A00-A1BD-05426D163862}"/>
+              </a:ext>
+            </a:extLst>
+          </p:cNvPr>
+          <p:cNvPicPr>
+            <a:picLocks noChangeAspect="1"/>
+          </p:cNvPicPr>
+          <p:nvPr/>
+        </p:nvPicPr>
+        <p:blipFill>
+          <a:blip r:embed="rId3"/>
+          <a:stretch>
+            <a:fillRect/>
+          </a:stretch>
+        </p:blipFill>
+        <p:spPr>
+          <a:xfrm>
+            <a:off x="763326" y="0"/>
+            <a:ext cx="4947557" cy="6858000"/>
+          </a:xfrm>
+          <a:prstGeom prst="rect">
+            <a:avLst/>
+          </a:prstGeom>
+        </p:spPr>
+      </p:pic>
+    </p:spTree>
+    <p:extLst>
+      <p:ext uri="{BB962C8B-B14F-4D97-AF65-F5344CB8AC3E}">
+        <p14:creationId xmlns:p14="http://schemas.microsoft.com/office/powerpoint/2010/main" val="3937895546"/>
+      </p:ext>
+    </p:extLst>
+  </p:cSld>
+  <p:clrMapOvr>
+    <a:masterClrMapping/>
+  </p:clrMapOvr>
+</p:sld>
+</file>
+
+<file path=ppt/slides/slide11.xml><?xml version="1.0" encoding="utf-8"?>
+<p:sld xmlns:a="http://schemas.openxmlformats.org/drawingml/2006/main" xmlns:r="http://schemas.openxmlformats.org/officeDocument/2006/relationships" xmlns:p="http://schemas.openxmlformats.org/presentationml/2006/main">
+  <p:cSld>
+    <p:spTree>
+      <p:nvGrpSpPr>
+        <p:cNvPr id="1" name=""/>
+        <p:cNvGrpSpPr/>
+        <p:nvPr/>
+      </p:nvGrpSpPr>
+      <p:grpSpPr>
+        <a:xfrm>
+          <a:off x="0" y="0"/>
+          <a:ext cx="0" cy="0"/>
+          <a:chOff x="0" y="0"/>
+          <a:chExt cx="0" cy="0"/>
+        </a:xfrm>
+      </p:grpSpPr>
+      <p:sp>
+        <p:nvSpPr>
+          <p:cNvPr id="2" name="Title 1">
+            <a:extLst>
+              <a:ext uri="{FF2B5EF4-FFF2-40B4-BE49-F238E27FC236}">
+                <a16:creationId xmlns:a16="http://schemas.microsoft.com/office/drawing/2014/main" id="{023D2A7A-93FD-42F8-92DD-89ACE1209D7A}"/>
+              </a:ext>
+            </a:extLst>
+          </p:cNvPr>
+          <p:cNvSpPr>
+            <a:spLocks noGrp="1"/>
+          </p:cNvSpPr>
+          <p:nvPr>
+            <p:ph type="title"/>
+          </p:nvPr>
+        </p:nvSpPr>
+        <p:spPr/>
+        <p:txBody>
+          <a:bodyPr/>
+          <a:lstStyle/>
+          <a:p>
+            <a:r>
+              <a:rPr lang="en-GB" dirty="0"/>
+              <a:t>Buch </a:t>
+            </a:r>
+            <a:r>
+              <a:rPr lang="en-GB" dirty="0" err="1"/>
+              <a:t>zum</a:t>
+            </a:r>
+            <a:r>
+              <a:rPr lang="en-GB" dirty="0"/>
+              <a:t> Thema</a:t>
+            </a:r>
+            <a:endParaRPr lang="en-AT" dirty="0"/>
+          </a:p>
+        </p:txBody>
+      </p:sp>
+      <p:sp>
+        <p:nvSpPr>
+          <p:cNvPr id="3" name="Content Placeholder 2">
+            <a:extLst>
+              <a:ext uri="{FF2B5EF4-FFF2-40B4-BE49-F238E27FC236}">
+                <a16:creationId xmlns:a16="http://schemas.microsoft.com/office/drawing/2014/main" id="{CDA9318C-3233-4A49-A1C7-8B447293306E}"/>
+              </a:ext>
+            </a:extLst>
+          </p:cNvPr>
+          <p:cNvSpPr>
+            <a:spLocks noGrp="1"/>
+          </p:cNvSpPr>
+          <p:nvPr>
+            <p:ph type="body" sz="quarter" idx="13"/>
+          </p:nvPr>
+        </p:nvSpPr>
+        <p:spPr/>
+        <p:txBody>
+          <a:bodyPr/>
+          <a:lstStyle/>
+          <a:p>
+            <a:r>
+              <a:rPr lang="en-GB" dirty="0"/>
+              <a:t>Humans vs Computers</a:t>
+            </a:r>
+            <a:endParaRPr lang="en-AT" dirty="0"/>
+          </a:p>
+        </p:txBody>
+      </p:sp>
+      <p:pic>
+        <p:nvPicPr>
+          <p:cNvPr id="5" name="Picture 4">
+            <a:extLst>
+              <a:ext uri="{FF2B5EF4-FFF2-40B4-BE49-F238E27FC236}">
+                <a16:creationId xmlns:a16="http://schemas.microsoft.com/office/drawing/2014/main" id="{41CEA48D-B10D-46EB-89D8-D1401DFF5684}"/>
+              </a:ext>
+            </a:extLst>
+          </p:cNvPr>
+          <p:cNvPicPr>
+            <a:picLocks noChangeAspect="1"/>
+          </p:cNvPicPr>
+          <p:nvPr/>
+        </p:nvPicPr>
+        <p:blipFill>
+          <a:blip r:embed="rId2"/>
+          <a:stretch>
+            <a:fillRect/>
+          </a:stretch>
+        </p:blipFill>
+        <p:spPr>
+          <a:xfrm>
+            <a:off x="5755964" y="1346545"/>
+            <a:ext cx="3263774" cy="4758856"/>
+          </a:xfrm>
+          <a:prstGeom prst="rect">
+            <a:avLst/>
+          </a:prstGeom>
+        </p:spPr>
+      </p:pic>
+    </p:spTree>
+    <p:extLst>
+      <p:ext uri="{BB962C8B-B14F-4D97-AF65-F5344CB8AC3E}">
+        <p14:creationId xmlns:p14="http://schemas.microsoft.com/office/powerpoint/2010/main" val="3243294617"/>
       </p:ext>
     </p:extLst>
   </p:cSld>
@@ -9470,10 +9688,1273 @@
   <p:clrMapOvr>
     <a:masterClrMapping/>
   </p:clrMapOvr>
+  <p:timing>
+    <p:tnLst>
+      <p:par>
+        <p:cTn id="1" dur="indefinite" restart="never" nodeType="tmRoot">
+          <p:childTnLst>
+            <p:seq concurrent="1" nextAc="seek">
+              <p:cTn id="2" dur="indefinite" nodeType="mainSeq">
+                <p:childTnLst>
+                  <p:par>
+                    <p:cTn id="3" fill="hold">
+                      <p:stCondLst>
+                        <p:cond delay="indefinite"/>
+                      </p:stCondLst>
+                      <p:childTnLst>
+                        <p:par>
+                          <p:cTn id="4" fill="hold">
+                            <p:stCondLst>
+                              <p:cond delay="0"/>
+                            </p:stCondLst>
+                            <p:childTnLst>
+                              <p:par>
+                                <p:cTn id="5" presetID="1" presetClass="entr" presetSubtype="0" fill="hold" grpId="0" nodeType="clickEffect">
+                                  <p:stCondLst>
+                                    <p:cond delay="0"/>
+                                  </p:stCondLst>
+                                  <p:childTnLst>
+                                    <p:set>
+                                      <p:cBhvr>
+                                        <p:cTn id="6" dur="1" fill="hold">
+                                          <p:stCondLst>
+                                            <p:cond delay="0"/>
+                                          </p:stCondLst>
+                                        </p:cTn>
+                                        <p:tgtEl>
+                                          <p:spTgt spid="5"/>
+                                        </p:tgtEl>
+                                        <p:attrNameLst>
+                                          <p:attrName>style.visibility</p:attrName>
+                                        </p:attrNameLst>
+                                      </p:cBhvr>
+                                      <p:to>
+                                        <p:strVal val="visible"/>
+                                      </p:to>
+                                    </p:set>
+                                  </p:childTnLst>
+                                </p:cTn>
+                              </p:par>
+                            </p:childTnLst>
+                          </p:cTn>
+                        </p:par>
+                      </p:childTnLst>
+                    </p:cTn>
+                  </p:par>
+                </p:childTnLst>
+              </p:cTn>
+              <p:prevCondLst>
+                <p:cond evt="onPrev" delay="0">
+                  <p:tgtEl>
+                    <p:sldTgt/>
+                  </p:tgtEl>
+                </p:cond>
+              </p:prevCondLst>
+              <p:nextCondLst>
+                <p:cond evt="onNext" delay="0">
+                  <p:tgtEl>
+                    <p:sldTgt/>
+                  </p:tgtEl>
+                </p:cond>
+              </p:nextCondLst>
+            </p:seq>
+          </p:childTnLst>
+        </p:cTn>
+      </p:par>
+    </p:tnLst>
+    <p:bldLst>
+      <p:bldP spid="5" grpId="0"/>
+    </p:bldLst>
+  </p:timing>
 </p:sld>
 </file>
 
 <file path=ppt/slides/slide6.xml><?xml version="1.0" encoding="utf-8"?>
+<p:sld xmlns:a="http://schemas.openxmlformats.org/drawingml/2006/main" xmlns:r="http://schemas.openxmlformats.org/officeDocument/2006/relationships" xmlns:p="http://schemas.openxmlformats.org/presentationml/2006/main">
+  <p:cSld>
+    <p:spTree>
+      <p:nvGrpSpPr>
+        <p:cNvPr id="1" name=""/>
+        <p:cNvGrpSpPr/>
+        <p:nvPr/>
+      </p:nvGrpSpPr>
+      <p:grpSpPr>
+        <a:xfrm>
+          <a:off x="0" y="0"/>
+          <a:ext cx="0" cy="0"/>
+          <a:chOff x="0" y="0"/>
+          <a:chExt cx="0" cy="0"/>
+        </a:xfrm>
+      </p:grpSpPr>
+      <p:pic>
+        <p:nvPicPr>
+          <p:cNvPr id="4" name="Picture 3">
+            <a:extLst>
+              <a:ext uri="{FF2B5EF4-FFF2-40B4-BE49-F238E27FC236}">
+                <a16:creationId xmlns:a16="http://schemas.microsoft.com/office/drawing/2014/main" id="{D885A85E-E692-4D53-A857-D67ED15A3EE6}"/>
+              </a:ext>
+            </a:extLst>
+          </p:cNvPr>
+          <p:cNvPicPr>
+            <a:picLocks noChangeAspect="1"/>
+          </p:cNvPicPr>
+          <p:nvPr/>
+        </p:nvPicPr>
+        <p:blipFill>
+          <a:blip r:embed="rId2">
+            <a:extLst>
+              <a:ext uri="{28A0092B-C50C-407E-A947-70E740481C1C}">
+                <a14:useLocalDpi xmlns:a14="http://schemas.microsoft.com/office/drawing/2010/main" val="0"/>
+              </a:ext>
+            </a:extLst>
+          </a:blip>
+          <a:srcRect/>
+          <a:stretch>
+            <a:fillRect/>
+          </a:stretch>
+        </p:blipFill>
+        <p:spPr bwMode="auto">
+          <a:xfrm>
+            <a:off x="3613610" y="823578"/>
+            <a:ext cx="7095953" cy="5581754"/>
+          </a:xfrm>
+          <a:prstGeom prst="rect">
+            <a:avLst/>
+          </a:prstGeom>
+          <a:noFill/>
+          <a:ln>
+            <a:noFill/>
+          </a:ln>
+        </p:spPr>
+      </p:pic>
+      <p:sp>
+        <p:nvSpPr>
+          <p:cNvPr id="5" name="Rectangle 4"/>
+          <p:cNvSpPr/>
+          <p:nvPr/>
+        </p:nvSpPr>
+        <p:spPr>
+          <a:xfrm>
+            <a:off x="3463636" y="740701"/>
+            <a:ext cx="484909" cy="5784790"/>
+          </a:xfrm>
+          <a:prstGeom prst="rect">
+            <a:avLst/>
+          </a:prstGeom>
+          <a:noFill/>
+          <a:ln w="57150">
+            <a:solidFill>
+              <a:srgbClr val="FF0000"/>
+            </a:solidFill>
+          </a:ln>
+        </p:spPr>
+        <p:style>
+          <a:lnRef idx="2">
+            <a:schemeClr val="accent1">
+              <a:shade val="50000"/>
+            </a:schemeClr>
+          </a:lnRef>
+          <a:fillRef idx="1">
+            <a:schemeClr val="accent1"/>
+          </a:fillRef>
+          <a:effectRef idx="0">
+            <a:schemeClr val="accent1"/>
+          </a:effectRef>
+          <a:fontRef idx="minor">
+            <a:schemeClr val="lt1"/>
+          </a:fontRef>
+        </p:style>
+        <p:txBody>
+          <a:bodyPr rtlCol="0" anchor="ctr"/>
+          <a:lstStyle/>
+          <a:p>
+            <a:pPr algn="ctr"/>
+            <a:endParaRPr lang="de-AT"/>
+          </a:p>
+        </p:txBody>
+      </p:sp>
+      <p:sp>
+        <p:nvSpPr>
+          <p:cNvPr id="6" name="TextBox 5"/>
+          <p:cNvSpPr txBox="1"/>
+          <p:nvPr/>
+        </p:nvSpPr>
+        <p:spPr>
+          <a:xfrm>
+            <a:off x="512618" y="823578"/>
+            <a:ext cx="1995055" cy="1200329"/>
+          </a:xfrm>
+          <a:prstGeom prst="rect">
+            <a:avLst/>
+          </a:prstGeom>
+          <a:noFill/>
+        </p:spPr>
+        <p:txBody>
+          <a:bodyPr wrap="square" rtlCol="0">
+            <a:spAutoFit/>
+          </a:bodyPr>
+          <a:lstStyle/>
+          <a:p>
+            <a:r>
+              <a:rPr lang="de-AT" dirty="0">
+                <a:solidFill>
+                  <a:srgbClr val="FF0000"/>
+                </a:solidFill>
+              </a:rPr>
+              <a:t>Status:</a:t>
+            </a:r>
+          </a:p>
+          <a:p>
+            <a:r>
+              <a:rPr lang="de-AT" dirty="0">
+                <a:solidFill>
+                  <a:srgbClr val="FF0000"/>
+                </a:solidFill>
+              </a:rPr>
+              <a:t>V = Valid</a:t>
+            </a:r>
+          </a:p>
+          <a:p>
+            <a:r>
+              <a:rPr lang="de-AT" dirty="0">
+                <a:solidFill>
+                  <a:srgbClr val="FF0000"/>
+                </a:solidFill>
+              </a:rPr>
+              <a:t>R = </a:t>
+            </a:r>
+            <a:r>
+              <a:rPr lang="de-AT" dirty="0" err="1">
+                <a:solidFill>
+                  <a:srgbClr val="FF0000"/>
+                </a:solidFill>
+              </a:rPr>
+              <a:t>Revoked</a:t>
+            </a:r>
+            <a:endParaRPr lang="de-AT" dirty="0">
+              <a:solidFill>
+                <a:srgbClr val="FF0000"/>
+              </a:solidFill>
+            </a:endParaRPr>
+          </a:p>
+          <a:p>
+            <a:r>
+              <a:rPr lang="de-AT" dirty="0">
+                <a:solidFill>
+                  <a:srgbClr val="FF0000"/>
+                </a:solidFill>
+              </a:rPr>
+              <a:t>E = </a:t>
+            </a:r>
+            <a:r>
+              <a:rPr lang="de-AT" dirty="0" err="1">
+                <a:solidFill>
+                  <a:srgbClr val="FF0000"/>
+                </a:solidFill>
+              </a:rPr>
+              <a:t>Expired</a:t>
+            </a:r>
+            <a:endParaRPr lang="de-AT" dirty="0">
+              <a:solidFill>
+                <a:srgbClr val="FF0000"/>
+              </a:solidFill>
+            </a:endParaRPr>
+          </a:p>
+        </p:txBody>
+      </p:sp>
+      <p:sp>
+        <p:nvSpPr>
+          <p:cNvPr id="7" name="Rectangle 6"/>
+          <p:cNvSpPr/>
+          <p:nvPr/>
+        </p:nvSpPr>
+        <p:spPr>
+          <a:xfrm>
+            <a:off x="4391890" y="722060"/>
+            <a:ext cx="1399310" cy="5784790"/>
+          </a:xfrm>
+          <a:prstGeom prst="rect">
+            <a:avLst/>
+          </a:prstGeom>
+          <a:noFill/>
+          <a:ln w="57150">
+            <a:solidFill>
+              <a:srgbClr val="00B050"/>
+            </a:solidFill>
+          </a:ln>
+        </p:spPr>
+        <p:style>
+          <a:lnRef idx="2">
+            <a:schemeClr val="accent1">
+              <a:shade val="50000"/>
+            </a:schemeClr>
+          </a:lnRef>
+          <a:fillRef idx="1">
+            <a:schemeClr val="accent1"/>
+          </a:fillRef>
+          <a:effectRef idx="0">
+            <a:schemeClr val="accent1"/>
+          </a:effectRef>
+          <a:fontRef idx="minor">
+            <a:schemeClr val="lt1"/>
+          </a:fontRef>
+        </p:style>
+        <p:txBody>
+          <a:bodyPr rtlCol="0" anchor="ctr"/>
+          <a:lstStyle/>
+          <a:p>
+            <a:pPr algn="ctr"/>
+            <a:endParaRPr lang="de-AT"/>
+          </a:p>
+        </p:txBody>
+      </p:sp>
+      <p:sp>
+        <p:nvSpPr>
+          <p:cNvPr id="8" name="TextBox 7"/>
+          <p:cNvSpPr txBox="1"/>
+          <p:nvPr/>
+        </p:nvSpPr>
+        <p:spPr>
+          <a:xfrm>
+            <a:off x="512617" y="2023907"/>
+            <a:ext cx="1995055" cy="369332"/>
+          </a:xfrm>
+          <a:prstGeom prst="rect">
+            <a:avLst/>
+          </a:prstGeom>
+          <a:noFill/>
+        </p:spPr>
+        <p:txBody>
+          <a:bodyPr wrap="square" rtlCol="0">
+            <a:spAutoFit/>
+          </a:bodyPr>
+          <a:lstStyle/>
+          <a:p>
+            <a:r>
+              <a:rPr lang="de-AT" dirty="0" err="1">
+                <a:solidFill>
+                  <a:srgbClr val="00B050"/>
+                </a:solidFill>
+              </a:rPr>
+              <a:t>Expiration</a:t>
+            </a:r>
+            <a:r>
+              <a:rPr lang="de-AT" dirty="0">
+                <a:solidFill>
+                  <a:srgbClr val="00B050"/>
+                </a:solidFill>
+              </a:rPr>
+              <a:t> Date</a:t>
+            </a:r>
+          </a:p>
+        </p:txBody>
+      </p:sp>
+      <p:sp>
+        <p:nvSpPr>
+          <p:cNvPr id="11" name="TextBox 10"/>
+          <p:cNvSpPr txBox="1"/>
+          <p:nvPr/>
+        </p:nvSpPr>
+        <p:spPr>
+          <a:xfrm>
+            <a:off x="493048" y="2393239"/>
+            <a:ext cx="1995055" cy="369332"/>
+          </a:xfrm>
+          <a:prstGeom prst="rect">
+            <a:avLst/>
+          </a:prstGeom>
+          <a:noFill/>
+        </p:spPr>
+        <p:txBody>
+          <a:bodyPr wrap="square" rtlCol="0">
+            <a:spAutoFit/>
+          </a:bodyPr>
+          <a:lstStyle/>
+          <a:p>
+            <a:r>
+              <a:rPr lang="de-AT" dirty="0" err="1">
+                <a:solidFill>
+                  <a:schemeClr val="accent1">
+                    <a:lumMod val="75000"/>
+                  </a:schemeClr>
+                </a:solidFill>
+              </a:rPr>
+              <a:t>Revocation</a:t>
+            </a:r>
+            <a:r>
+              <a:rPr lang="de-AT" dirty="0">
+                <a:solidFill>
+                  <a:schemeClr val="accent1">
+                    <a:lumMod val="75000"/>
+                  </a:schemeClr>
+                </a:solidFill>
+              </a:rPr>
+              <a:t> Date</a:t>
+            </a:r>
+          </a:p>
+        </p:txBody>
+      </p:sp>
+      <p:sp>
+        <p:nvSpPr>
+          <p:cNvPr id="13" name="Freeform 12"/>
+          <p:cNvSpPr/>
+          <p:nvPr/>
+        </p:nvSpPr>
+        <p:spPr>
+          <a:xfrm>
+            <a:off x="5905500" y="723900"/>
+            <a:ext cx="1447800" cy="5791200"/>
+          </a:xfrm>
+          <a:custGeom>
+            <a:avLst/>
+            <a:gdLst>
+              <a:gd name="connsiteX0" fmla="*/ 0 w 1447800"/>
+              <a:gd name="connsiteY0" fmla="*/ 0 h 5791200"/>
+              <a:gd name="connsiteX1" fmla="*/ 0 w 1447800"/>
+              <a:gd name="connsiteY1" fmla="*/ 5791200 h 5791200"/>
+              <a:gd name="connsiteX2" fmla="*/ 622300 w 1447800"/>
+              <a:gd name="connsiteY2" fmla="*/ 5791200 h 5791200"/>
+              <a:gd name="connsiteX3" fmla="*/ 622300 w 1447800"/>
+              <a:gd name="connsiteY3" fmla="*/ 3695700 h 5791200"/>
+              <a:gd name="connsiteX4" fmla="*/ 1447800 w 1447800"/>
+              <a:gd name="connsiteY4" fmla="*/ 3695700 h 5791200"/>
+              <a:gd name="connsiteX5" fmla="*/ 1447800 w 1447800"/>
+              <a:gd name="connsiteY5" fmla="*/ 3429000 h 5791200"/>
+              <a:gd name="connsiteX6" fmla="*/ 622300 w 1447800"/>
+              <a:gd name="connsiteY6" fmla="*/ 3429000 h 5791200"/>
+              <a:gd name="connsiteX7" fmla="*/ 622300 w 1447800"/>
+              <a:gd name="connsiteY7" fmla="*/ 2997200 h 5791200"/>
+              <a:gd name="connsiteX8" fmla="*/ 1435100 w 1447800"/>
+              <a:gd name="connsiteY8" fmla="*/ 2997200 h 5791200"/>
+              <a:gd name="connsiteX9" fmla="*/ 1435100 w 1447800"/>
+              <a:gd name="connsiteY9" fmla="*/ 2755900 h 5791200"/>
+              <a:gd name="connsiteX10" fmla="*/ 622300 w 1447800"/>
+              <a:gd name="connsiteY10" fmla="*/ 2755900 h 5791200"/>
+              <a:gd name="connsiteX11" fmla="*/ 622300 w 1447800"/>
+              <a:gd name="connsiteY11" fmla="*/ 2095500 h 5791200"/>
+              <a:gd name="connsiteX12" fmla="*/ 1435100 w 1447800"/>
+              <a:gd name="connsiteY12" fmla="*/ 2095500 h 5791200"/>
+              <a:gd name="connsiteX13" fmla="*/ 1435100 w 1447800"/>
+              <a:gd name="connsiteY13" fmla="*/ 1663700 h 5791200"/>
+              <a:gd name="connsiteX14" fmla="*/ 635000 w 1447800"/>
+              <a:gd name="connsiteY14" fmla="*/ 1663700 h 5791200"/>
+              <a:gd name="connsiteX15" fmla="*/ 635000 w 1447800"/>
+              <a:gd name="connsiteY15" fmla="*/ 0 h 5791200"/>
+              <a:gd name="connsiteX16" fmla="*/ 0 w 1447800"/>
+              <a:gd name="connsiteY16" fmla="*/ 0 h 5791200"/>
+            </a:gdLst>
+            <a:ahLst/>
+            <a:cxnLst>
+              <a:cxn ang="0">
+                <a:pos x="connsiteX0" y="connsiteY0"/>
+              </a:cxn>
+              <a:cxn ang="0">
+                <a:pos x="connsiteX1" y="connsiteY1"/>
+              </a:cxn>
+              <a:cxn ang="0">
+                <a:pos x="connsiteX2" y="connsiteY2"/>
+              </a:cxn>
+              <a:cxn ang="0">
+                <a:pos x="connsiteX3" y="connsiteY3"/>
+              </a:cxn>
+              <a:cxn ang="0">
+                <a:pos x="connsiteX4" y="connsiteY4"/>
+              </a:cxn>
+              <a:cxn ang="0">
+                <a:pos x="connsiteX5" y="connsiteY5"/>
+              </a:cxn>
+              <a:cxn ang="0">
+                <a:pos x="connsiteX6" y="connsiteY6"/>
+              </a:cxn>
+              <a:cxn ang="0">
+                <a:pos x="connsiteX7" y="connsiteY7"/>
+              </a:cxn>
+              <a:cxn ang="0">
+                <a:pos x="connsiteX8" y="connsiteY8"/>
+              </a:cxn>
+              <a:cxn ang="0">
+                <a:pos x="connsiteX9" y="connsiteY9"/>
+              </a:cxn>
+              <a:cxn ang="0">
+                <a:pos x="connsiteX10" y="connsiteY10"/>
+              </a:cxn>
+              <a:cxn ang="0">
+                <a:pos x="connsiteX11" y="connsiteY11"/>
+              </a:cxn>
+              <a:cxn ang="0">
+                <a:pos x="connsiteX12" y="connsiteY12"/>
+              </a:cxn>
+              <a:cxn ang="0">
+                <a:pos x="connsiteX13" y="connsiteY13"/>
+              </a:cxn>
+              <a:cxn ang="0">
+                <a:pos x="connsiteX14" y="connsiteY14"/>
+              </a:cxn>
+              <a:cxn ang="0">
+                <a:pos x="connsiteX15" y="connsiteY15"/>
+              </a:cxn>
+              <a:cxn ang="0">
+                <a:pos x="connsiteX16" y="connsiteY16"/>
+              </a:cxn>
+            </a:cxnLst>
+            <a:rect l="l" t="t" r="r" b="b"/>
+            <a:pathLst>
+              <a:path w="1447800" h="5791200">
+                <a:moveTo>
+                  <a:pt x="0" y="0"/>
+                </a:moveTo>
+                <a:lnTo>
+                  <a:pt x="0" y="5791200"/>
+                </a:lnTo>
+                <a:lnTo>
+                  <a:pt x="622300" y="5791200"/>
+                </a:lnTo>
+                <a:lnTo>
+                  <a:pt x="622300" y="3695700"/>
+                </a:lnTo>
+                <a:lnTo>
+                  <a:pt x="1447800" y="3695700"/>
+                </a:lnTo>
+                <a:lnTo>
+                  <a:pt x="1447800" y="3429000"/>
+                </a:lnTo>
+                <a:lnTo>
+                  <a:pt x="622300" y="3429000"/>
+                </a:lnTo>
+                <a:lnTo>
+                  <a:pt x="622300" y="2997200"/>
+                </a:lnTo>
+                <a:lnTo>
+                  <a:pt x="1435100" y="2997200"/>
+                </a:lnTo>
+                <a:lnTo>
+                  <a:pt x="1435100" y="2755900"/>
+                </a:lnTo>
+                <a:lnTo>
+                  <a:pt x="622300" y="2755900"/>
+                </a:lnTo>
+                <a:lnTo>
+                  <a:pt x="622300" y="2095500"/>
+                </a:lnTo>
+                <a:lnTo>
+                  <a:pt x="1435100" y="2095500"/>
+                </a:lnTo>
+                <a:lnTo>
+                  <a:pt x="1435100" y="1663700"/>
+                </a:lnTo>
+                <a:lnTo>
+                  <a:pt x="635000" y="1663700"/>
+                </a:lnTo>
+                <a:lnTo>
+                  <a:pt x="635000" y="0"/>
+                </a:lnTo>
+                <a:lnTo>
+                  <a:pt x="0" y="0"/>
+                </a:lnTo>
+                <a:close/>
+              </a:path>
+            </a:pathLst>
+          </a:custGeom>
+          <a:noFill/>
+          <a:ln w="38100">
+            <a:solidFill>
+              <a:schemeClr val="accent1">
+                <a:lumMod val="75000"/>
+              </a:schemeClr>
+            </a:solidFill>
+          </a:ln>
+        </p:spPr>
+        <p:style>
+          <a:lnRef idx="2">
+            <a:schemeClr val="accent1">
+              <a:shade val="50000"/>
+            </a:schemeClr>
+          </a:lnRef>
+          <a:fillRef idx="1">
+            <a:schemeClr val="accent1"/>
+          </a:fillRef>
+          <a:effectRef idx="0">
+            <a:schemeClr val="accent1"/>
+          </a:effectRef>
+          <a:fontRef idx="minor">
+            <a:schemeClr val="lt1"/>
+          </a:fontRef>
+        </p:style>
+        <p:txBody>
+          <a:bodyPr rtlCol="0" anchor="ctr"/>
+          <a:lstStyle/>
+          <a:p>
+            <a:pPr algn="ctr"/>
+            <a:endParaRPr lang="de-AT"/>
+          </a:p>
+        </p:txBody>
+      </p:sp>
+      <p:sp>
+        <p:nvSpPr>
+          <p:cNvPr id="14" name="Freeform 13"/>
+          <p:cNvSpPr/>
+          <p:nvPr/>
+        </p:nvSpPr>
+        <p:spPr>
+          <a:xfrm>
+            <a:off x="6629400" y="723900"/>
+            <a:ext cx="1346200" cy="5803900"/>
+          </a:xfrm>
+          <a:custGeom>
+            <a:avLst/>
+            <a:gdLst>
+              <a:gd name="connsiteX0" fmla="*/ 25400 w 1346200"/>
+              <a:gd name="connsiteY0" fmla="*/ 0 h 5803900"/>
+              <a:gd name="connsiteX1" fmla="*/ 25400 w 1346200"/>
+              <a:gd name="connsiteY1" fmla="*/ 1651000 h 5803900"/>
+              <a:gd name="connsiteX2" fmla="*/ 863600 w 1346200"/>
+              <a:gd name="connsiteY2" fmla="*/ 1651000 h 5803900"/>
+              <a:gd name="connsiteX3" fmla="*/ 863600 w 1346200"/>
+              <a:gd name="connsiteY3" fmla="*/ 2133600 h 5803900"/>
+              <a:gd name="connsiteX4" fmla="*/ 0 w 1346200"/>
+              <a:gd name="connsiteY4" fmla="*/ 2133600 h 5803900"/>
+              <a:gd name="connsiteX5" fmla="*/ 0 w 1346200"/>
+              <a:gd name="connsiteY5" fmla="*/ 2730500 h 5803900"/>
+              <a:gd name="connsiteX6" fmla="*/ 876300 w 1346200"/>
+              <a:gd name="connsiteY6" fmla="*/ 2730500 h 5803900"/>
+              <a:gd name="connsiteX7" fmla="*/ 876300 w 1346200"/>
+              <a:gd name="connsiteY7" fmla="*/ 3060700 h 5803900"/>
+              <a:gd name="connsiteX8" fmla="*/ 12700 w 1346200"/>
+              <a:gd name="connsiteY8" fmla="*/ 3060700 h 5803900"/>
+              <a:gd name="connsiteX9" fmla="*/ 12700 w 1346200"/>
+              <a:gd name="connsiteY9" fmla="*/ 3403600 h 5803900"/>
+              <a:gd name="connsiteX10" fmla="*/ 876300 w 1346200"/>
+              <a:gd name="connsiteY10" fmla="*/ 3403600 h 5803900"/>
+              <a:gd name="connsiteX11" fmla="*/ 876300 w 1346200"/>
+              <a:gd name="connsiteY11" fmla="*/ 3721100 h 5803900"/>
+              <a:gd name="connsiteX12" fmla="*/ 25400 w 1346200"/>
+              <a:gd name="connsiteY12" fmla="*/ 3721100 h 5803900"/>
+              <a:gd name="connsiteX13" fmla="*/ 25400 w 1346200"/>
+              <a:gd name="connsiteY13" fmla="*/ 5803900 h 5803900"/>
+              <a:gd name="connsiteX14" fmla="*/ 977900 w 1346200"/>
+              <a:gd name="connsiteY14" fmla="*/ 5803900 h 5803900"/>
+              <a:gd name="connsiteX15" fmla="*/ 977900 w 1346200"/>
+              <a:gd name="connsiteY15" fmla="*/ 3708400 h 5803900"/>
+              <a:gd name="connsiteX16" fmla="*/ 1346200 w 1346200"/>
+              <a:gd name="connsiteY16" fmla="*/ 3708400 h 5803900"/>
+              <a:gd name="connsiteX17" fmla="*/ 1346200 w 1346200"/>
+              <a:gd name="connsiteY17" fmla="*/ 3416300 h 5803900"/>
+              <a:gd name="connsiteX18" fmla="*/ 952500 w 1346200"/>
+              <a:gd name="connsiteY18" fmla="*/ 3416300 h 5803900"/>
+              <a:gd name="connsiteX19" fmla="*/ 952500 w 1346200"/>
+              <a:gd name="connsiteY19" fmla="*/ 3022600 h 5803900"/>
+              <a:gd name="connsiteX20" fmla="*/ 1320800 w 1346200"/>
+              <a:gd name="connsiteY20" fmla="*/ 3022600 h 5803900"/>
+              <a:gd name="connsiteX21" fmla="*/ 1320800 w 1346200"/>
+              <a:gd name="connsiteY21" fmla="*/ 2781300 h 5803900"/>
+              <a:gd name="connsiteX22" fmla="*/ 939800 w 1346200"/>
+              <a:gd name="connsiteY22" fmla="*/ 2781300 h 5803900"/>
+              <a:gd name="connsiteX23" fmla="*/ 939800 w 1346200"/>
+              <a:gd name="connsiteY23" fmla="*/ 2095500 h 5803900"/>
+              <a:gd name="connsiteX24" fmla="*/ 1282700 w 1346200"/>
+              <a:gd name="connsiteY24" fmla="*/ 2095500 h 5803900"/>
+              <a:gd name="connsiteX25" fmla="*/ 1282700 w 1346200"/>
+              <a:gd name="connsiteY25" fmla="*/ 1663700 h 5803900"/>
+              <a:gd name="connsiteX26" fmla="*/ 952500 w 1346200"/>
+              <a:gd name="connsiteY26" fmla="*/ 1663700 h 5803900"/>
+              <a:gd name="connsiteX27" fmla="*/ 952500 w 1346200"/>
+              <a:gd name="connsiteY27" fmla="*/ 0 h 5803900"/>
+              <a:gd name="connsiteX28" fmla="*/ 25400 w 1346200"/>
+              <a:gd name="connsiteY28" fmla="*/ 0 h 5803900"/>
+            </a:gdLst>
+            <a:ahLst/>
+            <a:cxnLst>
+              <a:cxn ang="0">
+                <a:pos x="connsiteX0" y="connsiteY0"/>
+              </a:cxn>
+              <a:cxn ang="0">
+                <a:pos x="connsiteX1" y="connsiteY1"/>
+              </a:cxn>
+              <a:cxn ang="0">
+                <a:pos x="connsiteX2" y="connsiteY2"/>
+              </a:cxn>
+              <a:cxn ang="0">
+                <a:pos x="connsiteX3" y="connsiteY3"/>
+              </a:cxn>
+              <a:cxn ang="0">
+                <a:pos x="connsiteX4" y="connsiteY4"/>
+              </a:cxn>
+              <a:cxn ang="0">
+                <a:pos x="connsiteX5" y="connsiteY5"/>
+              </a:cxn>
+              <a:cxn ang="0">
+                <a:pos x="connsiteX6" y="connsiteY6"/>
+              </a:cxn>
+              <a:cxn ang="0">
+                <a:pos x="connsiteX7" y="connsiteY7"/>
+              </a:cxn>
+              <a:cxn ang="0">
+                <a:pos x="connsiteX8" y="connsiteY8"/>
+              </a:cxn>
+              <a:cxn ang="0">
+                <a:pos x="connsiteX9" y="connsiteY9"/>
+              </a:cxn>
+              <a:cxn ang="0">
+                <a:pos x="connsiteX10" y="connsiteY10"/>
+              </a:cxn>
+              <a:cxn ang="0">
+                <a:pos x="connsiteX11" y="connsiteY11"/>
+              </a:cxn>
+              <a:cxn ang="0">
+                <a:pos x="connsiteX12" y="connsiteY12"/>
+              </a:cxn>
+              <a:cxn ang="0">
+                <a:pos x="connsiteX13" y="connsiteY13"/>
+              </a:cxn>
+              <a:cxn ang="0">
+                <a:pos x="connsiteX14" y="connsiteY14"/>
+              </a:cxn>
+              <a:cxn ang="0">
+                <a:pos x="connsiteX15" y="connsiteY15"/>
+              </a:cxn>
+              <a:cxn ang="0">
+                <a:pos x="connsiteX16" y="connsiteY16"/>
+              </a:cxn>
+              <a:cxn ang="0">
+                <a:pos x="connsiteX17" y="connsiteY17"/>
+              </a:cxn>
+              <a:cxn ang="0">
+                <a:pos x="connsiteX18" y="connsiteY18"/>
+              </a:cxn>
+              <a:cxn ang="0">
+                <a:pos x="connsiteX19" y="connsiteY19"/>
+              </a:cxn>
+              <a:cxn ang="0">
+                <a:pos x="connsiteX20" y="connsiteY20"/>
+              </a:cxn>
+              <a:cxn ang="0">
+                <a:pos x="connsiteX21" y="connsiteY21"/>
+              </a:cxn>
+              <a:cxn ang="0">
+                <a:pos x="connsiteX22" y="connsiteY22"/>
+              </a:cxn>
+              <a:cxn ang="0">
+                <a:pos x="connsiteX23" y="connsiteY23"/>
+              </a:cxn>
+              <a:cxn ang="0">
+                <a:pos x="connsiteX24" y="connsiteY24"/>
+              </a:cxn>
+              <a:cxn ang="0">
+                <a:pos x="connsiteX25" y="connsiteY25"/>
+              </a:cxn>
+              <a:cxn ang="0">
+                <a:pos x="connsiteX26" y="connsiteY26"/>
+              </a:cxn>
+              <a:cxn ang="0">
+                <a:pos x="connsiteX27" y="connsiteY27"/>
+              </a:cxn>
+              <a:cxn ang="0">
+                <a:pos x="connsiteX28" y="connsiteY28"/>
+              </a:cxn>
+            </a:cxnLst>
+            <a:rect l="l" t="t" r="r" b="b"/>
+            <a:pathLst>
+              <a:path w="1346200" h="5803900">
+                <a:moveTo>
+                  <a:pt x="25400" y="0"/>
+                </a:moveTo>
+                <a:lnTo>
+                  <a:pt x="25400" y="1651000"/>
+                </a:lnTo>
+                <a:lnTo>
+                  <a:pt x="863600" y="1651000"/>
+                </a:lnTo>
+                <a:lnTo>
+                  <a:pt x="863600" y="2133600"/>
+                </a:lnTo>
+                <a:lnTo>
+                  <a:pt x="0" y="2133600"/>
+                </a:lnTo>
+                <a:lnTo>
+                  <a:pt x="0" y="2730500"/>
+                </a:lnTo>
+                <a:lnTo>
+                  <a:pt x="876300" y="2730500"/>
+                </a:lnTo>
+                <a:lnTo>
+                  <a:pt x="876300" y="3060700"/>
+                </a:lnTo>
+                <a:lnTo>
+                  <a:pt x="12700" y="3060700"/>
+                </a:lnTo>
+                <a:lnTo>
+                  <a:pt x="12700" y="3403600"/>
+                </a:lnTo>
+                <a:lnTo>
+                  <a:pt x="876300" y="3403600"/>
+                </a:lnTo>
+                <a:lnTo>
+                  <a:pt x="876300" y="3721100"/>
+                </a:lnTo>
+                <a:lnTo>
+                  <a:pt x="25400" y="3721100"/>
+                </a:lnTo>
+                <a:lnTo>
+                  <a:pt x="25400" y="5803900"/>
+                </a:lnTo>
+                <a:lnTo>
+                  <a:pt x="977900" y="5803900"/>
+                </a:lnTo>
+                <a:lnTo>
+                  <a:pt x="977900" y="3708400"/>
+                </a:lnTo>
+                <a:lnTo>
+                  <a:pt x="1346200" y="3708400"/>
+                </a:lnTo>
+                <a:lnTo>
+                  <a:pt x="1346200" y="3416300"/>
+                </a:lnTo>
+                <a:lnTo>
+                  <a:pt x="952500" y="3416300"/>
+                </a:lnTo>
+                <a:lnTo>
+                  <a:pt x="952500" y="3022600"/>
+                </a:lnTo>
+                <a:lnTo>
+                  <a:pt x="1320800" y="3022600"/>
+                </a:lnTo>
+                <a:lnTo>
+                  <a:pt x="1320800" y="2781300"/>
+                </a:lnTo>
+                <a:lnTo>
+                  <a:pt x="939800" y="2781300"/>
+                </a:lnTo>
+                <a:lnTo>
+                  <a:pt x="939800" y="2095500"/>
+                </a:lnTo>
+                <a:lnTo>
+                  <a:pt x="1282700" y="2095500"/>
+                </a:lnTo>
+                <a:lnTo>
+                  <a:pt x="1282700" y="1663700"/>
+                </a:lnTo>
+                <a:lnTo>
+                  <a:pt x="952500" y="1663700"/>
+                </a:lnTo>
+                <a:lnTo>
+                  <a:pt x="952500" y="0"/>
+                </a:lnTo>
+                <a:lnTo>
+                  <a:pt x="25400" y="0"/>
+                </a:lnTo>
+                <a:close/>
+              </a:path>
+            </a:pathLst>
+          </a:custGeom>
+          <a:noFill/>
+          <a:ln w="38100">
+            <a:solidFill>
+              <a:srgbClr val="FFC000"/>
+            </a:solidFill>
+          </a:ln>
+        </p:spPr>
+        <p:style>
+          <a:lnRef idx="2">
+            <a:schemeClr val="accent1">
+              <a:shade val="50000"/>
+            </a:schemeClr>
+          </a:lnRef>
+          <a:fillRef idx="1">
+            <a:schemeClr val="accent1"/>
+          </a:fillRef>
+          <a:effectRef idx="0">
+            <a:schemeClr val="accent1"/>
+          </a:effectRef>
+          <a:fontRef idx="minor">
+            <a:schemeClr val="lt1"/>
+          </a:fontRef>
+        </p:style>
+        <p:txBody>
+          <a:bodyPr rtlCol="0" anchor="ctr"/>
+          <a:lstStyle/>
+          <a:p>
+            <a:pPr algn="ctr"/>
+            <a:endParaRPr lang="de-AT"/>
+          </a:p>
+        </p:txBody>
+      </p:sp>
+      <p:sp>
+        <p:nvSpPr>
+          <p:cNvPr id="15" name="TextBox 14"/>
+          <p:cNvSpPr txBox="1"/>
+          <p:nvPr/>
+        </p:nvSpPr>
+        <p:spPr>
+          <a:xfrm>
+            <a:off x="512617" y="2762571"/>
+            <a:ext cx="1995055" cy="369332"/>
+          </a:xfrm>
+          <a:prstGeom prst="rect">
+            <a:avLst/>
+          </a:prstGeom>
+          <a:noFill/>
+        </p:spPr>
+        <p:txBody>
+          <a:bodyPr wrap="square" rtlCol="0">
+            <a:spAutoFit/>
+          </a:bodyPr>
+          <a:lstStyle/>
+          <a:p>
+            <a:r>
+              <a:rPr lang="de-AT" dirty="0">
+                <a:solidFill>
+                  <a:schemeClr val="accent1">
+                    <a:lumMod val="75000"/>
+                  </a:schemeClr>
+                </a:solidFill>
+              </a:rPr>
+              <a:t>Serial</a:t>
+            </a:r>
+          </a:p>
+        </p:txBody>
+      </p:sp>
+    </p:spTree>
+    <p:extLst>
+      <p:ext uri="{BB962C8B-B14F-4D97-AF65-F5344CB8AC3E}">
+        <p14:creationId xmlns:p14="http://schemas.microsoft.com/office/powerpoint/2010/main" val="3942751863"/>
+      </p:ext>
+    </p:extLst>
+  </p:cSld>
+  <p:clrMapOvr>
+    <a:masterClrMapping/>
+  </p:clrMapOvr>
+  <p:timing>
+    <p:tnLst>
+      <p:par>
+        <p:cTn id="1" dur="indefinite" restart="never" nodeType="tmRoot">
+          <p:childTnLst>
+            <p:seq concurrent="1" nextAc="seek">
+              <p:cTn id="2" dur="indefinite" nodeType="mainSeq">
+                <p:childTnLst>
+                  <p:par>
+                    <p:cTn id="3" fill="hold">
+                      <p:stCondLst>
+                        <p:cond delay="indefinite"/>
+                      </p:stCondLst>
+                      <p:childTnLst>
+                        <p:par>
+                          <p:cTn id="4" fill="hold">
+                            <p:stCondLst>
+                              <p:cond delay="0"/>
+                            </p:stCondLst>
+                            <p:childTnLst>
+                              <p:par>
+                                <p:cTn id="5" presetID="1" presetClass="entr" presetSubtype="0" fill="hold" grpId="0" nodeType="clickEffect">
+                                  <p:stCondLst>
+                                    <p:cond delay="0"/>
+                                  </p:stCondLst>
+                                  <p:childTnLst>
+                                    <p:set>
+                                      <p:cBhvr>
+                                        <p:cTn id="6" dur="1" fill="hold">
+                                          <p:stCondLst>
+                                            <p:cond delay="0"/>
+                                          </p:stCondLst>
+                                        </p:cTn>
+                                        <p:tgtEl>
+                                          <p:spTgt spid="5"/>
+                                        </p:tgtEl>
+                                        <p:attrNameLst>
+                                          <p:attrName>style.visibility</p:attrName>
+                                        </p:attrNameLst>
+                                      </p:cBhvr>
+                                      <p:to>
+                                        <p:strVal val="visible"/>
+                                      </p:to>
+                                    </p:set>
+                                  </p:childTnLst>
+                                </p:cTn>
+                              </p:par>
+                              <p:par>
+                                <p:cTn id="7" presetID="1" presetClass="entr" presetSubtype="0" fill="hold" grpId="0" nodeType="withEffect">
+                                  <p:stCondLst>
+                                    <p:cond delay="0"/>
+                                  </p:stCondLst>
+                                  <p:childTnLst>
+                                    <p:set>
+                                      <p:cBhvr>
+                                        <p:cTn id="8" dur="1" fill="hold">
+                                          <p:stCondLst>
+                                            <p:cond delay="0"/>
+                                          </p:stCondLst>
+                                        </p:cTn>
+                                        <p:tgtEl>
+                                          <p:spTgt spid="6"/>
+                                        </p:tgtEl>
+                                        <p:attrNameLst>
+                                          <p:attrName>style.visibility</p:attrName>
+                                        </p:attrNameLst>
+                                      </p:cBhvr>
+                                      <p:to>
+                                        <p:strVal val="visible"/>
+                                      </p:to>
+                                    </p:set>
+                                  </p:childTnLst>
+                                </p:cTn>
+                              </p:par>
+                            </p:childTnLst>
+                          </p:cTn>
+                        </p:par>
+                      </p:childTnLst>
+                    </p:cTn>
+                  </p:par>
+                  <p:par>
+                    <p:cTn id="9" fill="hold">
+                      <p:stCondLst>
+                        <p:cond delay="indefinite"/>
+                      </p:stCondLst>
+                      <p:childTnLst>
+                        <p:par>
+                          <p:cTn id="10" fill="hold">
+                            <p:stCondLst>
+                              <p:cond delay="0"/>
+                            </p:stCondLst>
+                            <p:childTnLst>
+                              <p:par>
+                                <p:cTn id="11" presetID="1" presetClass="entr" presetSubtype="0" fill="hold" grpId="0" nodeType="clickEffect">
+                                  <p:stCondLst>
+                                    <p:cond delay="0"/>
+                                  </p:stCondLst>
+                                  <p:childTnLst>
+                                    <p:set>
+                                      <p:cBhvr>
+                                        <p:cTn id="12" dur="1" fill="hold">
+                                          <p:stCondLst>
+                                            <p:cond delay="0"/>
+                                          </p:stCondLst>
+                                        </p:cTn>
+                                        <p:tgtEl>
+                                          <p:spTgt spid="7"/>
+                                        </p:tgtEl>
+                                        <p:attrNameLst>
+                                          <p:attrName>style.visibility</p:attrName>
+                                        </p:attrNameLst>
+                                      </p:cBhvr>
+                                      <p:to>
+                                        <p:strVal val="visible"/>
+                                      </p:to>
+                                    </p:set>
+                                  </p:childTnLst>
+                                </p:cTn>
+                              </p:par>
+                              <p:par>
+                                <p:cTn id="13" presetID="1" presetClass="entr" presetSubtype="0" fill="hold" grpId="0" nodeType="withEffect">
+                                  <p:stCondLst>
+                                    <p:cond delay="0"/>
+                                  </p:stCondLst>
+                                  <p:childTnLst>
+                                    <p:set>
+                                      <p:cBhvr>
+                                        <p:cTn id="14" dur="1" fill="hold">
+                                          <p:stCondLst>
+                                            <p:cond delay="0"/>
+                                          </p:stCondLst>
+                                        </p:cTn>
+                                        <p:tgtEl>
+                                          <p:spTgt spid="8"/>
+                                        </p:tgtEl>
+                                        <p:attrNameLst>
+                                          <p:attrName>style.visibility</p:attrName>
+                                        </p:attrNameLst>
+                                      </p:cBhvr>
+                                      <p:to>
+                                        <p:strVal val="visible"/>
+                                      </p:to>
+                                    </p:set>
+                                  </p:childTnLst>
+                                </p:cTn>
+                              </p:par>
+                            </p:childTnLst>
+                          </p:cTn>
+                        </p:par>
+                      </p:childTnLst>
+                    </p:cTn>
+                  </p:par>
+                  <p:par>
+                    <p:cTn id="15" fill="hold">
+                      <p:stCondLst>
+                        <p:cond delay="indefinite"/>
+                      </p:stCondLst>
+                      <p:childTnLst>
+                        <p:par>
+                          <p:cTn id="16" fill="hold">
+                            <p:stCondLst>
+                              <p:cond delay="0"/>
+                            </p:stCondLst>
+                            <p:childTnLst>
+                              <p:par>
+                                <p:cTn id="17" presetID="1" presetClass="entr" presetSubtype="0" fill="hold" grpId="0" nodeType="clickEffect">
+                                  <p:stCondLst>
+                                    <p:cond delay="0"/>
+                                  </p:stCondLst>
+                                  <p:childTnLst>
+                                    <p:set>
+                                      <p:cBhvr>
+                                        <p:cTn id="18" dur="1" fill="hold">
+                                          <p:stCondLst>
+                                            <p:cond delay="0"/>
+                                          </p:stCondLst>
+                                        </p:cTn>
+                                        <p:tgtEl>
+                                          <p:spTgt spid="11"/>
+                                        </p:tgtEl>
+                                        <p:attrNameLst>
+                                          <p:attrName>style.visibility</p:attrName>
+                                        </p:attrNameLst>
+                                      </p:cBhvr>
+                                      <p:to>
+                                        <p:strVal val="visible"/>
+                                      </p:to>
+                                    </p:set>
+                                  </p:childTnLst>
+                                </p:cTn>
+                              </p:par>
+                              <p:par>
+                                <p:cTn id="19" presetID="1" presetClass="entr" presetSubtype="0" fill="hold" grpId="0" nodeType="withEffect">
+                                  <p:stCondLst>
+                                    <p:cond delay="0"/>
+                                  </p:stCondLst>
+                                  <p:childTnLst>
+                                    <p:set>
+                                      <p:cBhvr>
+                                        <p:cTn id="20" dur="1" fill="hold">
+                                          <p:stCondLst>
+                                            <p:cond delay="0"/>
+                                          </p:stCondLst>
+                                        </p:cTn>
+                                        <p:tgtEl>
+                                          <p:spTgt spid="13"/>
+                                        </p:tgtEl>
+                                        <p:attrNameLst>
+                                          <p:attrName>style.visibility</p:attrName>
+                                        </p:attrNameLst>
+                                      </p:cBhvr>
+                                      <p:to>
+                                        <p:strVal val="visible"/>
+                                      </p:to>
+                                    </p:set>
+                                  </p:childTnLst>
+                                </p:cTn>
+                              </p:par>
+                            </p:childTnLst>
+                          </p:cTn>
+                        </p:par>
+                      </p:childTnLst>
+                    </p:cTn>
+                  </p:par>
+                  <p:par>
+                    <p:cTn id="21" fill="hold">
+                      <p:stCondLst>
+                        <p:cond delay="indefinite"/>
+                      </p:stCondLst>
+                      <p:childTnLst>
+                        <p:par>
+                          <p:cTn id="22" fill="hold">
+                            <p:stCondLst>
+                              <p:cond delay="0"/>
+                            </p:stCondLst>
+                            <p:childTnLst>
+                              <p:par>
+                                <p:cTn id="23" presetID="1" presetClass="entr" presetSubtype="0" fill="hold" grpId="0" nodeType="clickEffect">
+                                  <p:stCondLst>
+                                    <p:cond delay="0"/>
+                                  </p:stCondLst>
+                                  <p:childTnLst>
+                                    <p:set>
+                                      <p:cBhvr>
+                                        <p:cTn id="24" dur="1" fill="hold">
+                                          <p:stCondLst>
+                                            <p:cond delay="0"/>
+                                          </p:stCondLst>
+                                        </p:cTn>
+                                        <p:tgtEl>
+                                          <p:spTgt spid="15"/>
+                                        </p:tgtEl>
+                                        <p:attrNameLst>
+                                          <p:attrName>style.visibility</p:attrName>
+                                        </p:attrNameLst>
+                                      </p:cBhvr>
+                                      <p:to>
+                                        <p:strVal val="visible"/>
+                                      </p:to>
+                                    </p:set>
+                                  </p:childTnLst>
+                                </p:cTn>
+                              </p:par>
+                              <p:par>
+                                <p:cTn id="25" presetID="1" presetClass="entr" presetSubtype="0" fill="hold" grpId="0" nodeType="withEffect">
+                                  <p:stCondLst>
+                                    <p:cond delay="0"/>
+                                  </p:stCondLst>
+                                  <p:childTnLst>
+                                    <p:set>
+                                      <p:cBhvr>
+                                        <p:cTn id="26" dur="1" fill="hold">
+                                          <p:stCondLst>
+                                            <p:cond delay="0"/>
+                                          </p:stCondLst>
+                                        </p:cTn>
+                                        <p:tgtEl>
+                                          <p:spTgt spid="14"/>
+                                        </p:tgtEl>
+                                        <p:attrNameLst>
+                                          <p:attrName>style.visibility</p:attrName>
+                                        </p:attrNameLst>
+                                      </p:cBhvr>
+                                      <p:to>
+                                        <p:strVal val="visible"/>
+                                      </p:to>
+                                    </p:set>
+                                  </p:childTnLst>
+                                </p:cTn>
+                              </p:par>
+                            </p:childTnLst>
+                          </p:cTn>
+                        </p:par>
+                      </p:childTnLst>
+                    </p:cTn>
+                  </p:par>
+                </p:childTnLst>
+              </p:cTn>
+              <p:prevCondLst>
+                <p:cond evt="onPrev" delay="0">
+                  <p:tgtEl>
+                    <p:sldTgt/>
+                  </p:tgtEl>
+                </p:cond>
+              </p:prevCondLst>
+              <p:nextCondLst>
+                <p:cond evt="onNext" delay="0">
+                  <p:tgtEl>
+                    <p:sldTgt/>
+                  </p:tgtEl>
+                </p:cond>
+              </p:nextCondLst>
+            </p:seq>
+          </p:childTnLst>
+        </p:cTn>
+      </p:par>
+    </p:tnLst>
+    <p:bldLst>
+      <p:bldP spid="5" grpId="0" animBg="1"/>
+      <p:bldP spid="6" grpId="0"/>
+      <p:bldP spid="7" grpId="0" animBg="1"/>
+      <p:bldP spid="8" grpId="0"/>
+      <p:bldP spid="11" grpId="0"/>
+      <p:bldP spid="13" grpId="0" animBg="1"/>
+      <p:bldP spid="14" grpId="0" animBg="1"/>
+      <p:bldP spid="15" grpId="0"/>
+    </p:bldLst>
+  </p:timing>
+</p:sld>
+</file>
+
+<file path=ppt/slides/slide7.xml><?xml version="1.0" encoding="utf-8"?>
 <p:sld xmlns:a="http://schemas.openxmlformats.org/drawingml/2006/main" xmlns:r="http://schemas.openxmlformats.org/officeDocument/2006/relationships" xmlns:p="http://schemas.openxmlformats.org/presentationml/2006/main">
   <p:cSld>
     <p:spTree>
@@ -9533,7 +11014,7 @@
 </p:sld>
 </file>
 
-<file path=ppt/slides/slide7.xml><?xml version="1.0" encoding="utf-8"?>
+<file path=ppt/slides/slide8.xml><?xml version="1.0" encoding="utf-8"?>
 <p:sld xmlns:a="http://schemas.openxmlformats.org/drawingml/2006/main" xmlns:r="http://schemas.openxmlformats.org/officeDocument/2006/relationships" xmlns:p="http://schemas.openxmlformats.org/presentationml/2006/main">
   <p:cSld>
     <p:spTree>
@@ -9853,96 +11334,6 @@
 </p:sld>
 </file>
 
-<file path=ppt/slides/slide8.xml><?xml version="1.0" encoding="utf-8"?>
-<p:sld xmlns:a="http://schemas.openxmlformats.org/drawingml/2006/main" xmlns:r="http://schemas.openxmlformats.org/officeDocument/2006/relationships" xmlns:p="http://schemas.openxmlformats.org/presentationml/2006/main">
-  <p:cSld>
-    <p:spTree>
-      <p:nvGrpSpPr>
-        <p:cNvPr id="1" name=""/>
-        <p:cNvGrpSpPr/>
-        <p:nvPr/>
-      </p:nvGrpSpPr>
-      <p:grpSpPr>
-        <a:xfrm>
-          <a:off x="0" y="0"/>
-          <a:ext cx="0" cy="0"/>
-          <a:chOff x="0" y="0"/>
-          <a:chExt cx="0" cy="0"/>
-        </a:xfrm>
-      </p:grpSpPr>
-      <p:pic>
-        <p:nvPicPr>
-          <p:cNvPr id="5" name="Picture 4">
-            <a:extLst>
-              <a:ext uri="{FF2B5EF4-FFF2-40B4-BE49-F238E27FC236}">
-                <a16:creationId xmlns:a16="http://schemas.microsoft.com/office/drawing/2014/main" id="{DDE5771A-5809-48F4-B564-DB3921DC7456}"/>
-              </a:ext>
-            </a:extLst>
-          </p:cNvPr>
-          <p:cNvPicPr>
-            <a:picLocks noChangeAspect="1"/>
-          </p:cNvPicPr>
-          <p:nvPr/>
-        </p:nvPicPr>
-        <p:blipFill>
-          <a:blip r:embed="rId2"/>
-          <a:stretch>
-            <a:fillRect/>
-          </a:stretch>
-        </p:blipFill>
-        <p:spPr>
-          <a:xfrm>
-            <a:off x="6558589" y="0"/>
-            <a:ext cx="4529416" cy="6858000"/>
-          </a:xfrm>
-          <a:prstGeom prst="rect">
-            <a:avLst/>
-          </a:prstGeom>
-        </p:spPr>
-      </p:pic>
-      <p:pic>
-        <p:nvPicPr>
-          <p:cNvPr id="3" name="Picture 2">
-            <a:extLst>
-              <a:ext uri="{FF2B5EF4-FFF2-40B4-BE49-F238E27FC236}">
-                <a16:creationId xmlns:a16="http://schemas.microsoft.com/office/drawing/2014/main" id="{7D1DFDAC-891A-4A00-A1BD-05426D163862}"/>
-              </a:ext>
-            </a:extLst>
-          </p:cNvPr>
-          <p:cNvPicPr>
-            <a:picLocks noChangeAspect="1"/>
-          </p:cNvPicPr>
-          <p:nvPr/>
-        </p:nvPicPr>
-        <p:blipFill>
-          <a:blip r:embed="rId3"/>
-          <a:stretch>
-            <a:fillRect/>
-          </a:stretch>
-        </p:blipFill>
-        <p:spPr>
-          <a:xfrm>
-            <a:off x="763326" y="0"/>
-            <a:ext cx="4947557" cy="6858000"/>
-          </a:xfrm>
-          <a:prstGeom prst="rect">
-            <a:avLst/>
-          </a:prstGeom>
-        </p:spPr>
-      </p:pic>
-    </p:spTree>
-    <p:extLst>
-      <p:ext uri="{BB962C8B-B14F-4D97-AF65-F5344CB8AC3E}">
-        <p14:creationId xmlns:p14="http://schemas.microsoft.com/office/powerpoint/2010/main" val="3937895546"/>
-      </p:ext>
-    </p:extLst>
-  </p:cSld>
-  <p:clrMapOvr>
-    <a:masterClrMapping/>
-  </p:clrMapOvr>
-</p:sld>
-</file>
-
 <file path=ppt/slides/slide9.xml><?xml version="1.0" encoding="utf-8"?>
 <p:sld xmlns:a="http://schemas.openxmlformats.org/drawingml/2006/main" xmlns:r="http://schemas.openxmlformats.org/officeDocument/2006/relationships" xmlns:p="http://schemas.openxmlformats.org/presentationml/2006/main">
   <p:cSld>
@@ -9962,10 +11353,154 @@
       </p:grpSpPr>
       <p:sp>
         <p:nvSpPr>
-          <p:cNvPr id="2" name="Title 1">
+          <p:cNvPr id="2" name="Text Placeholder 1">
             <a:extLst>
               <a:ext uri="{FF2B5EF4-FFF2-40B4-BE49-F238E27FC236}">
-                <a16:creationId xmlns:a16="http://schemas.microsoft.com/office/drawing/2014/main" id="{023D2A7A-93FD-42F8-92DD-89ACE1209D7A}"/>
+                <a16:creationId xmlns:a16="http://schemas.microsoft.com/office/drawing/2014/main" id="{6855A55D-C0A0-4CA4-9FC1-98C7F207EE63}"/>
+              </a:ext>
+            </a:extLst>
+          </p:cNvPr>
+          <p:cNvSpPr>
+            <a:spLocks noGrp="1"/>
+          </p:cNvSpPr>
+          <p:nvPr>
+            <p:ph type="body" sz="quarter" idx="13"/>
+          </p:nvPr>
+        </p:nvSpPr>
+        <p:spPr>
+          <a:xfrm>
+            <a:off x="837565" y="1468381"/>
+            <a:ext cx="10346647" cy="4716000"/>
+          </a:xfrm>
+        </p:spPr>
+        <p:txBody>
+          <a:bodyPr tIns="72000" bIns="0">
+            <a:normAutofit fontScale="55000" lnSpcReduction="20000"/>
+          </a:bodyPr>
+          <a:lstStyle/>
+          <a:p>
+            <a:r>
+              <a:rPr lang="de-DE" dirty="0"/>
+              <a:t>Wie hätte der Fehler früher gefunden werden können?</a:t>
+            </a:r>
+          </a:p>
+          <a:p>
+            <a:pPr lvl="1"/>
+            <a:r>
+              <a:rPr lang="de-DE" dirty="0"/>
+              <a:t>Naming hat nicht geholfen</a:t>
+            </a:r>
+          </a:p>
+          <a:p>
+            <a:pPr lvl="1"/>
+            <a:r>
+              <a:rPr lang="de-DE" dirty="0"/>
+              <a:t>Tests, auch zum Debuggen</a:t>
+            </a:r>
+          </a:p>
+          <a:p>
+            <a:pPr lvl="1"/>
+            <a:r>
+              <a:rPr lang="de-DE" dirty="0"/>
+              <a:t>Refactoring</a:t>
+            </a:r>
+          </a:p>
+          <a:p>
+            <a:pPr lvl="2"/>
+            <a:r>
+              <a:rPr lang="de-DE" dirty="0"/>
+              <a:t>strcmp nur mit „n“ (null terminator Risiko)</a:t>
+            </a:r>
+          </a:p>
+          <a:p>
+            <a:pPr lvl="2"/>
+            <a:r>
+              <a:rPr lang="de-DE" dirty="0"/>
+              <a:t>free direkt wenn nicht mehr gebraucht</a:t>
+            </a:r>
+          </a:p>
+          <a:p>
+            <a:pPr lvl="2"/>
+            <a:r>
+              <a:rPr lang="de-DE" dirty="0"/>
+              <a:t>Expired setzen in eigene Funktion</a:t>
+            </a:r>
+          </a:p>
+          <a:p>
+            <a:pPr lvl="2"/>
+            <a:r>
+              <a:rPr lang="de-DE" dirty="0"/>
+              <a:t>Nesting level niedriger</a:t>
+            </a:r>
+          </a:p>
+          <a:p>
+            <a:pPr lvl="2"/>
+            <a:r>
+              <a:rPr lang="de-DE" dirty="0"/>
+              <a:t>If checks in sprechende Funktion</a:t>
+            </a:r>
+          </a:p>
+          <a:p>
+            <a:pPr lvl="2"/>
+            <a:r>
+              <a:rPr lang="de-DE" dirty="0"/>
+              <a:t>Prüfen ob vorher/nachher check nicht duplicated ist</a:t>
+            </a:r>
+          </a:p>
+          <a:p>
+            <a:pPr lvl="3"/>
+            <a:r>
+              <a:rPr lang="de-DE" dirty="0"/>
+              <a:t>-&gt; evtl zusammenführen</a:t>
+            </a:r>
+          </a:p>
+          <a:p>
+            <a:r>
+              <a:rPr lang="de-DE" dirty="0"/>
+              <a:t>Auf welche Arten könnten wir den Fehler lösen?</a:t>
+            </a:r>
+          </a:p>
+          <a:p>
+            <a:pPr lvl="1"/>
+            <a:r>
+              <a:rPr lang="de-DE" dirty="0"/>
+              <a:t>gibt es schon eine Vergleichsfunktion?</a:t>
+            </a:r>
+          </a:p>
+          <a:p>
+            <a:pPr lvl="2"/>
+            <a:r>
+              <a:rPr lang="de-DE" dirty="0"/>
+              <a:t>-&gt; Falls ja, einsetzen</a:t>
+            </a:r>
+          </a:p>
+          <a:p>
+            <a:pPr lvl="1"/>
+            <a:r>
+              <a:rPr lang="de-DE" dirty="0"/>
+              <a:t>Differenzieren anhand der Spaltenlänge (+2 Zeichen im neuen Format)</a:t>
+            </a:r>
+          </a:p>
+          <a:p>
+            <a:pPr lvl="1"/>
+            <a:r>
+              <a:rPr lang="de-DE" dirty="0"/>
+              <a:t>Methode "SanitizeDateTime", die eine reguläre Datetime oder Jahr als Integer returniert, auf </a:t>
+            </a:r>
+            <a:r>
+              <a:rPr lang="de-DE"/>
+              <a:t>beiden Formaten</a:t>
+            </a:r>
+            <a:endParaRPr lang="de-DE" dirty="0"/>
+          </a:p>
+        </p:txBody>
+      </p:sp>
+      <p:sp>
+        <p:nvSpPr>
+          <p:cNvPr id="3" name="Title 2">
+            <a:extLst>
+              <a:ext uri="{FF2B5EF4-FFF2-40B4-BE49-F238E27FC236}">
+                <a16:creationId xmlns:a16="http://schemas.microsoft.com/office/drawing/2014/main" id="{669B8E64-E65B-4277-8164-392906A7800D}"/>
               </a:ext>
             </a:extLst>
           </p:cNvPr>
@@ -9976,90 +11511,28 @@
             <p:ph type="title"/>
           </p:nvPr>
         </p:nvSpPr>
-        <p:spPr/>
+        <p:spPr>
+          <a:xfrm>
+            <a:off x="837565" y="740701"/>
+            <a:ext cx="10346647" cy="594715"/>
+          </a:xfrm>
+        </p:spPr>
         <p:txBody>
           <a:bodyPr/>
           <a:lstStyle/>
           <a:p>
             <a:r>
-              <a:rPr lang="en-GB" dirty="0"/>
-              <a:t>Buch </a:t>
-            </a:r>
-            <a:r>
               <a:rPr lang="en-GB" dirty="0" err="1"/>
-              <a:t>zum</a:t>
-            </a:r>
-            <a:r>
-              <a:rPr lang="en-GB" dirty="0"/>
-              <a:t> Thema</a:t>
+              <a:t>Erkenntnisse</a:t>
             </a:r>
             <a:endParaRPr lang="en-AT" dirty="0"/>
           </a:p>
         </p:txBody>
       </p:sp>
-      <p:sp>
-        <p:nvSpPr>
-          <p:cNvPr id="3" name="Content Placeholder 2">
-            <a:extLst>
-              <a:ext uri="{FF2B5EF4-FFF2-40B4-BE49-F238E27FC236}">
-                <a16:creationId xmlns:a16="http://schemas.microsoft.com/office/drawing/2014/main" id="{CDA9318C-3233-4A49-A1C7-8B447293306E}"/>
-              </a:ext>
-            </a:extLst>
-          </p:cNvPr>
-          <p:cNvSpPr>
-            <a:spLocks noGrp="1"/>
-          </p:cNvSpPr>
-          <p:nvPr>
-            <p:ph type="body" sz="quarter" idx="13"/>
-          </p:nvPr>
-        </p:nvSpPr>
-        <p:spPr/>
-        <p:txBody>
-          <a:bodyPr/>
-          <a:lstStyle/>
-          <a:p>
-            <a:r>
-              <a:rPr lang="en-GB" dirty="0"/>
-              <a:t>Humans vs Computers</a:t>
-            </a:r>
-            <a:endParaRPr lang="en-AT" dirty="0"/>
-          </a:p>
-        </p:txBody>
-      </p:sp>
-      <p:pic>
-        <p:nvPicPr>
-          <p:cNvPr id="5" name="Picture 4">
-            <a:extLst>
-              <a:ext uri="{FF2B5EF4-FFF2-40B4-BE49-F238E27FC236}">
-                <a16:creationId xmlns:a16="http://schemas.microsoft.com/office/drawing/2014/main" id="{41CEA48D-B10D-46EB-89D8-D1401DFF5684}"/>
-              </a:ext>
-            </a:extLst>
-          </p:cNvPr>
-          <p:cNvPicPr>
-            <a:picLocks noChangeAspect="1"/>
-          </p:cNvPicPr>
-          <p:nvPr/>
-        </p:nvPicPr>
-        <p:blipFill>
-          <a:blip r:embed="rId2"/>
-          <a:stretch>
-            <a:fillRect/>
-          </a:stretch>
-        </p:blipFill>
-        <p:spPr>
-          <a:xfrm>
-            <a:off x="5755964" y="1346545"/>
-            <a:ext cx="3263774" cy="4758856"/>
-          </a:xfrm>
-          <a:prstGeom prst="rect">
-            <a:avLst/>
-          </a:prstGeom>
-        </p:spPr>
-      </p:pic>
     </p:spTree>
     <p:extLst>
       <p:ext uri="{BB962C8B-B14F-4D97-AF65-F5344CB8AC3E}">
-        <p14:creationId xmlns:p14="http://schemas.microsoft.com/office/powerpoint/2010/main" val="3243294617"/>
+        <p14:creationId xmlns:p14="http://schemas.microsoft.com/office/powerpoint/2010/main" val="1916527656"/>
       </p:ext>
     </p:extLst>
   </p:cSld>

</xml_diff>